<commit_message>
Uppdaterat utbildningsmaterial och dokumentation för EyeDoc 3.7
</commit_message>
<xml_diff>
--- a/Utbildningsmaterial/Steg 1 - Manus/Utbildning Blankettproduktion Manus.pptx
+++ b/Utbildningsmaterial/Steg 1 - Manus/Utbildning Blankettproduktion Manus.pptx
@@ -248,7 +248,7 @@
           <a:p>
             <a:fld id="{B0CBC212-F8B5-4C2E-81E6-7E62664EE8E8}" type="datetimeFigureOut">
               <a:rPr lang="sv-SE" smtClean="0"/>
-              <a:t>2016-08-23</a:t>
+              <a:t>2016-08-24</a:t>
             </a:fld>
             <a:endParaRPr lang="sv-SE"/>
           </a:p>
@@ -414,7 +414,7 @@
             <a:fld id="{3E49C2C0-97DA-499D-9E25-C813C9F39A10}" type="datetimeFigureOut">
               <a:rPr lang="nb-NO" smtClean="0"/>
               <a:pPr/>
-              <a:t>23.08.2016</a:t>
+              <a:t>24.08.2016</a:t>
             </a:fld>
             <a:endParaRPr lang="nb-NO"/>
           </a:p>
@@ -930,6 +930,91 @@
 </file>
 
 <file path=ppt/notesSlides/notesSlide2.xml><?xml version="1.0" encoding="utf-8"?>
+<p:notes xmlns:a="http://schemas.openxmlformats.org/drawingml/2006/main" xmlns:r="http://schemas.openxmlformats.org/officeDocument/2006/relationships" xmlns:p="http://schemas.openxmlformats.org/presentationml/2006/main">
+  <p:cSld>
+    <p:spTree>
+      <p:nvGrpSpPr>
+        <p:cNvPr id="1" name=""/>
+        <p:cNvGrpSpPr/>
+        <p:nvPr/>
+      </p:nvGrpSpPr>
+      <p:grpSpPr>
+        <a:xfrm>
+          <a:off x="0" y="0"/>
+          <a:ext cx="0" cy="0"/>
+          <a:chOff x="0" y="0"/>
+          <a:chExt cx="0" cy="0"/>
+        </a:xfrm>
+      </p:grpSpPr>
+      <p:sp>
+        <p:nvSpPr>
+          <p:cNvPr id="2" name="Slide Image Placeholder 1"/>
+          <p:cNvSpPr>
+            <a:spLocks noGrp="1" noRot="1" noChangeAspect="1"/>
+          </p:cNvSpPr>
+          <p:nvPr>
+            <p:ph type="sldImg"/>
+          </p:nvPr>
+        </p:nvSpPr>
+        <p:spPr/>
+      </p:sp>
+      <p:sp>
+        <p:nvSpPr>
+          <p:cNvPr id="3" name="Notes Placeholder 2"/>
+          <p:cNvSpPr>
+            <a:spLocks noGrp="1"/>
+          </p:cNvSpPr>
+          <p:nvPr>
+            <p:ph type="body" idx="1"/>
+          </p:nvPr>
+        </p:nvSpPr>
+        <p:spPr/>
+        <p:txBody>
+          <a:bodyPr/>
+          <a:lstStyle/>
+          <a:p>
+            <a:endParaRPr lang="sv-SE" dirty="0"/>
+          </a:p>
+        </p:txBody>
+      </p:sp>
+      <p:sp>
+        <p:nvSpPr>
+          <p:cNvPr id="4" name="Slide Number Placeholder 3"/>
+          <p:cNvSpPr>
+            <a:spLocks noGrp="1"/>
+          </p:cNvSpPr>
+          <p:nvPr>
+            <p:ph type="sldNum" sz="quarter" idx="10"/>
+          </p:nvPr>
+        </p:nvSpPr>
+        <p:spPr/>
+        <p:txBody>
+          <a:bodyPr/>
+          <a:lstStyle/>
+          <a:p>
+            <a:fld id="{7579B03F-A892-4A67-8671-FE6AA3A6F0AE}" type="slidenum">
+              <a:rPr lang="nb-NO" smtClean="0"/>
+              <a:pPr/>
+              <a:t>22</a:t>
+            </a:fld>
+            <a:endParaRPr lang="nb-NO"/>
+          </a:p>
+        </p:txBody>
+      </p:sp>
+    </p:spTree>
+    <p:extLst>
+      <p:ext uri="{BB962C8B-B14F-4D97-AF65-F5344CB8AC3E}">
+        <p14:creationId xmlns:p14="http://schemas.microsoft.com/office/powerpoint/2010/main" val="819850663"/>
+      </p:ext>
+    </p:extLst>
+  </p:cSld>
+  <p:clrMapOvr>
+    <a:masterClrMapping/>
+  </p:clrMapOvr>
+</p:notes>
+</file>
+
+<file path=ppt/notesSlides/notesSlide3.xml><?xml version="1.0" encoding="utf-8"?>
 <p:notes xmlns:a="http://schemas.openxmlformats.org/drawingml/2006/main" xmlns:r="http://schemas.openxmlformats.org/officeDocument/2006/relationships" xmlns:p="http://schemas.openxmlformats.org/presentationml/2006/main">
   <p:cSld>
     <p:spTree>
@@ -12843,7 +12928,7 @@
                 </a:solidFill>
                 <a:latin typeface="Arial Narrow" pitchFamily="34" charset="0"/>
               </a:rPr>
-              <a:t>2016-08-23</a:t>
+              <a:t>2016-08-24</a:t>
             </a:r>
           </a:p>
         </p:txBody>
@@ -18796,10 +18881,7 @@
           <a:bodyPr/>
           <a:lstStyle/>
           <a:p>
-            <a:r>
-              <a:rPr lang="nb-NO" dirty="0"/>
-              <a:t>2015-06-16</a:t>
-            </a:r>
+            <a:endParaRPr lang="nb-NO" dirty="0"/>
           </a:p>
         </p:txBody>
       </p:sp>

</xml_diff>